<commit_message>
fix per generazione ppt
</commit_message>
<xml_diff>
--- a/Migration_Summary_Presentation.pptx
+++ b/Migration_Summary_Presentation.pptx
@@ -5,7 +5,7 @@
     <p:sldMasterId id="2147483648" r:id="rId1"/>
   </p:sldMasterIdLst>
   <p:sldIdLst>
-    <p:sldId id="256" r:id="rId2"/>
+    <p:sldId id="256" r:id="rId7"/>
   </p:sldIdLst>
   <p:sldSz cx="9144000" cy="6858000" type="screen4x3"/>
   <p:notesSz cx="6858000" cy="9144000"/>
@@ -104,22 +104,6 @@
       </a:defRPr>
     </a:lvl9pPr>
   </p:defaultTextStyle>
-  <p:extLst>
-    <p:ext uri="{EFAFB233-063F-42B5-8137-9DF3F51BA10A}">
-      <p15:sldGuideLst xmlns:p15="http://schemas.microsoft.com/office/powerpoint/2012/main">
-        <p15:guide id="1" orient="horz" pos="2160">
-          <p15:clr>
-            <a:srgbClr val="A4A3A4"/>
-          </p15:clr>
-        </p15:guide>
-        <p15:guide id="2" pos="2880">
-          <p15:clr>
-            <a:srgbClr val="A4A3A4"/>
-          </p15:clr>
-        </p15:guide>
-      </p15:sldGuideLst>
-    </p:ext>
-  </p:extLst>
 </p:presentation>
 </file>
 
@@ -161,9 +145,10 @@
           <a:lstStyle/>
           <a:p>
             <a:r>
-              <a:rPr lang="en-US"/>
+              <a:rPr lang="en-US" smtClean="0"/>
               <a:t>Click to edit Master title style</a:t>
             </a:r>
+            <a:endParaRPr lang="en-US"/>
           </a:p>
         </p:txBody>
       </p:sp>
@@ -279,9 +264,10 @@
           </a:lstStyle>
           <a:p>
             <a:r>
-              <a:rPr lang="en-US"/>
+              <a:rPr lang="en-US" smtClean="0"/>
               <a:t>Click to edit Master subtitle style</a:t>
             </a:r>
+            <a:endParaRPr lang="en-US"/>
           </a:p>
         </p:txBody>
       </p:sp>
@@ -302,7 +288,7 @@
           <a:p>
             <a:fld id="{5BCAD085-E8A6-8845-BD4E-CB4CCA059FC4}" type="datetimeFigureOut">
               <a:rPr lang="en-US" smtClean="0"/>
-              <a:t>1/26/2026</a:t>
+              <a:t>1/27/13</a:t>
             </a:fld>
             <a:endParaRPr lang="en-US"/>
           </a:p>
@@ -344,7 +330,7 @@
           <a:p>
             <a:fld id="{C1FF6DA9-008F-8B48-92A6-B652298478BF}" type="slidenum">
               <a:rPr lang="en-US" smtClean="0"/>
-              <a:t>‹N›</a:t>
+              <a:t>‹#›</a:t>
             </a:fld>
             <a:endParaRPr lang="en-US"/>
           </a:p>
@@ -396,9 +382,10 @@
           <a:lstStyle/>
           <a:p>
             <a:r>
-              <a:rPr lang="en-US"/>
+              <a:rPr lang="en-US" smtClean="0"/>
               <a:t>Click to edit Master title style</a:t>
             </a:r>
+            <a:endParaRPr lang="en-US"/>
           </a:p>
         </p:txBody>
       </p:sp>
@@ -419,37 +406,38 @@
           <a:p>
             <a:pPr lvl="0"/>
             <a:r>
-              <a:rPr lang="en-US"/>
+              <a:rPr lang="en-US" smtClean="0"/>
               <a:t>Click to edit Master text styles</a:t>
             </a:r>
           </a:p>
           <a:p>
             <a:pPr lvl="1"/>
             <a:r>
-              <a:rPr lang="en-US"/>
+              <a:rPr lang="en-US" smtClean="0"/>
               <a:t>Second level</a:t>
             </a:r>
           </a:p>
           <a:p>
             <a:pPr lvl="2"/>
             <a:r>
-              <a:rPr lang="en-US"/>
+              <a:rPr lang="en-US" smtClean="0"/>
               <a:t>Third level</a:t>
             </a:r>
           </a:p>
           <a:p>
             <a:pPr lvl="3"/>
             <a:r>
-              <a:rPr lang="en-US"/>
+              <a:rPr lang="en-US" smtClean="0"/>
               <a:t>Fourth level</a:t>
             </a:r>
           </a:p>
           <a:p>
             <a:pPr lvl="4"/>
             <a:r>
-              <a:rPr lang="en-US"/>
+              <a:rPr lang="en-US" smtClean="0"/>
               <a:t>Fifth level</a:t>
             </a:r>
+            <a:endParaRPr lang="en-US"/>
           </a:p>
         </p:txBody>
       </p:sp>
@@ -470,7 +458,7 @@
           <a:p>
             <a:fld id="{5BCAD085-E8A6-8845-BD4E-CB4CCA059FC4}" type="datetimeFigureOut">
               <a:rPr lang="en-US" smtClean="0"/>
-              <a:t>1/26/2026</a:t>
+              <a:t>1/27/13</a:t>
             </a:fld>
             <a:endParaRPr lang="en-US"/>
           </a:p>
@@ -512,7 +500,7 @@
           <a:p>
             <a:fld id="{C1FF6DA9-008F-8B48-92A6-B652298478BF}" type="slidenum">
               <a:rPr lang="en-US" smtClean="0"/>
-              <a:t>‹N›</a:t>
+              <a:t>‹#›</a:t>
             </a:fld>
             <a:endParaRPr lang="en-US"/>
           </a:p>
@@ -569,9 +557,10 @@
           <a:lstStyle/>
           <a:p>
             <a:r>
-              <a:rPr lang="en-US"/>
+              <a:rPr lang="en-US" smtClean="0"/>
               <a:t>Click to edit Master title style</a:t>
             </a:r>
+            <a:endParaRPr lang="en-US"/>
           </a:p>
         </p:txBody>
       </p:sp>
@@ -597,37 +586,38 @@
           <a:p>
             <a:pPr lvl="0"/>
             <a:r>
-              <a:rPr lang="en-US"/>
+              <a:rPr lang="en-US" smtClean="0"/>
               <a:t>Click to edit Master text styles</a:t>
             </a:r>
           </a:p>
           <a:p>
             <a:pPr lvl="1"/>
             <a:r>
-              <a:rPr lang="en-US"/>
+              <a:rPr lang="en-US" smtClean="0"/>
               <a:t>Second level</a:t>
             </a:r>
           </a:p>
           <a:p>
             <a:pPr lvl="2"/>
             <a:r>
-              <a:rPr lang="en-US"/>
+              <a:rPr lang="en-US" smtClean="0"/>
               <a:t>Third level</a:t>
             </a:r>
           </a:p>
           <a:p>
             <a:pPr lvl="3"/>
             <a:r>
-              <a:rPr lang="en-US"/>
+              <a:rPr lang="en-US" smtClean="0"/>
               <a:t>Fourth level</a:t>
             </a:r>
           </a:p>
           <a:p>
             <a:pPr lvl="4"/>
             <a:r>
-              <a:rPr lang="en-US"/>
+              <a:rPr lang="en-US" smtClean="0"/>
               <a:t>Fifth level</a:t>
             </a:r>
+            <a:endParaRPr lang="en-US"/>
           </a:p>
         </p:txBody>
       </p:sp>
@@ -648,7 +638,7 @@
           <a:p>
             <a:fld id="{5BCAD085-E8A6-8845-BD4E-CB4CCA059FC4}" type="datetimeFigureOut">
               <a:rPr lang="en-US" smtClean="0"/>
-              <a:t>1/26/2026</a:t>
+              <a:t>1/27/13</a:t>
             </a:fld>
             <a:endParaRPr lang="en-US"/>
           </a:p>
@@ -690,7 +680,7 @@
           <a:p>
             <a:fld id="{C1FF6DA9-008F-8B48-92A6-B652298478BF}" type="slidenum">
               <a:rPr lang="en-US" smtClean="0"/>
-              <a:t>‹N›</a:t>
+              <a:t>‹#›</a:t>
             </a:fld>
             <a:endParaRPr lang="en-US"/>
           </a:p>
@@ -742,9 +732,10 @@
           <a:lstStyle/>
           <a:p>
             <a:r>
-              <a:rPr lang="en-US"/>
+              <a:rPr lang="en-US" smtClean="0"/>
               <a:t>Click to edit Master title style</a:t>
             </a:r>
+            <a:endParaRPr lang="en-US"/>
           </a:p>
         </p:txBody>
       </p:sp>
@@ -765,37 +756,38 @@
           <a:p>
             <a:pPr lvl="0"/>
             <a:r>
-              <a:rPr lang="en-US"/>
+              <a:rPr lang="en-US" smtClean="0"/>
               <a:t>Click to edit Master text styles</a:t>
             </a:r>
           </a:p>
           <a:p>
             <a:pPr lvl="1"/>
             <a:r>
-              <a:rPr lang="en-US"/>
+              <a:rPr lang="en-US" smtClean="0"/>
               <a:t>Second level</a:t>
             </a:r>
           </a:p>
           <a:p>
             <a:pPr lvl="2"/>
             <a:r>
-              <a:rPr lang="en-US"/>
+              <a:rPr lang="en-US" smtClean="0"/>
               <a:t>Third level</a:t>
             </a:r>
           </a:p>
           <a:p>
             <a:pPr lvl="3"/>
             <a:r>
-              <a:rPr lang="en-US"/>
+              <a:rPr lang="en-US" smtClean="0"/>
               <a:t>Fourth level</a:t>
             </a:r>
           </a:p>
           <a:p>
             <a:pPr lvl="4"/>
             <a:r>
-              <a:rPr lang="en-US"/>
+              <a:rPr lang="en-US" smtClean="0"/>
               <a:t>Fifth level</a:t>
             </a:r>
+            <a:endParaRPr lang="en-US"/>
           </a:p>
         </p:txBody>
       </p:sp>
@@ -816,7 +808,7 @@
           <a:p>
             <a:fld id="{5BCAD085-E8A6-8845-BD4E-CB4CCA059FC4}" type="datetimeFigureOut">
               <a:rPr lang="en-US" smtClean="0"/>
-              <a:t>1/26/2026</a:t>
+              <a:t>1/27/13</a:t>
             </a:fld>
             <a:endParaRPr lang="en-US"/>
           </a:p>
@@ -858,7 +850,7 @@
           <a:p>
             <a:fld id="{C1FF6DA9-008F-8B48-92A6-B652298478BF}" type="slidenum">
               <a:rPr lang="en-US" smtClean="0"/>
-              <a:t>‹N›</a:t>
+              <a:t>‹#›</a:t>
             </a:fld>
             <a:endParaRPr lang="en-US"/>
           </a:p>
@@ -919,9 +911,10 @@
           </a:lstStyle>
           <a:p>
             <a:r>
-              <a:rPr lang="en-US"/>
+              <a:rPr lang="en-US" smtClean="0"/>
               <a:t>Click to edit Master title style</a:t>
             </a:r>
+            <a:endParaRPr lang="en-US"/>
           </a:p>
         </p:txBody>
       </p:sp>
@@ -1038,7 +1031,7 @@
           <a:p>
             <a:pPr lvl="0"/>
             <a:r>
-              <a:rPr lang="en-US"/>
+              <a:rPr lang="en-US" smtClean="0"/>
               <a:t>Click to edit Master text styles</a:t>
             </a:r>
           </a:p>
@@ -1061,7 +1054,7 @@
           <a:p>
             <a:fld id="{5BCAD085-E8A6-8845-BD4E-CB4CCA059FC4}" type="datetimeFigureOut">
               <a:rPr lang="en-US" smtClean="0"/>
-              <a:t>1/26/2026</a:t>
+              <a:t>1/27/13</a:t>
             </a:fld>
             <a:endParaRPr lang="en-US"/>
           </a:p>
@@ -1103,7 +1096,7 @@
           <a:p>
             <a:fld id="{C1FF6DA9-008F-8B48-92A6-B652298478BF}" type="slidenum">
               <a:rPr lang="en-US" smtClean="0"/>
-              <a:t>‹N›</a:t>
+              <a:t>‹#›</a:t>
             </a:fld>
             <a:endParaRPr lang="en-US"/>
           </a:p>
@@ -1155,9 +1148,10 @@
           <a:lstStyle/>
           <a:p>
             <a:r>
-              <a:rPr lang="en-US"/>
+              <a:rPr lang="en-US" smtClean="0"/>
               <a:t>Click to edit Master title style</a:t>
             </a:r>
+            <a:endParaRPr lang="en-US"/>
           </a:p>
         </p:txBody>
       </p:sp>
@@ -1211,37 +1205,38 @@
           <a:p>
             <a:pPr lvl="0"/>
             <a:r>
-              <a:rPr lang="en-US"/>
+              <a:rPr lang="en-US" smtClean="0"/>
               <a:t>Click to edit Master text styles</a:t>
             </a:r>
           </a:p>
           <a:p>
             <a:pPr lvl="1"/>
             <a:r>
-              <a:rPr lang="en-US"/>
+              <a:rPr lang="en-US" smtClean="0"/>
               <a:t>Second level</a:t>
             </a:r>
           </a:p>
           <a:p>
             <a:pPr lvl="2"/>
             <a:r>
-              <a:rPr lang="en-US"/>
+              <a:rPr lang="en-US" smtClean="0"/>
               <a:t>Third level</a:t>
             </a:r>
           </a:p>
           <a:p>
             <a:pPr lvl="3"/>
             <a:r>
-              <a:rPr lang="en-US"/>
+              <a:rPr lang="en-US" smtClean="0"/>
               <a:t>Fourth level</a:t>
             </a:r>
           </a:p>
           <a:p>
             <a:pPr lvl="4"/>
             <a:r>
-              <a:rPr lang="en-US"/>
+              <a:rPr lang="en-US" smtClean="0"/>
               <a:t>Fifth level</a:t>
             </a:r>
+            <a:endParaRPr lang="en-US"/>
           </a:p>
         </p:txBody>
       </p:sp>
@@ -1295,37 +1290,38 @@
           <a:p>
             <a:pPr lvl="0"/>
             <a:r>
-              <a:rPr lang="en-US"/>
+              <a:rPr lang="en-US" smtClean="0"/>
               <a:t>Click to edit Master text styles</a:t>
             </a:r>
           </a:p>
           <a:p>
             <a:pPr lvl="1"/>
             <a:r>
-              <a:rPr lang="en-US"/>
+              <a:rPr lang="en-US" smtClean="0"/>
               <a:t>Second level</a:t>
             </a:r>
           </a:p>
           <a:p>
             <a:pPr lvl="2"/>
             <a:r>
-              <a:rPr lang="en-US"/>
+              <a:rPr lang="en-US" smtClean="0"/>
               <a:t>Third level</a:t>
             </a:r>
           </a:p>
           <a:p>
             <a:pPr lvl="3"/>
             <a:r>
-              <a:rPr lang="en-US"/>
+              <a:rPr lang="en-US" smtClean="0"/>
               <a:t>Fourth level</a:t>
             </a:r>
           </a:p>
           <a:p>
             <a:pPr lvl="4"/>
             <a:r>
-              <a:rPr lang="en-US"/>
+              <a:rPr lang="en-US" smtClean="0"/>
               <a:t>Fifth level</a:t>
             </a:r>
+            <a:endParaRPr lang="en-US"/>
           </a:p>
         </p:txBody>
       </p:sp>
@@ -1346,7 +1342,7 @@
           <a:p>
             <a:fld id="{5BCAD085-E8A6-8845-BD4E-CB4CCA059FC4}" type="datetimeFigureOut">
               <a:rPr lang="en-US" smtClean="0"/>
-              <a:t>1/26/2026</a:t>
+              <a:t>1/27/13</a:t>
             </a:fld>
             <a:endParaRPr lang="en-US"/>
           </a:p>
@@ -1388,7 +1384,7 @@
           <a:p>
             <a:fld id="{C1FF6DA9-008F-8B48-92A6-B652298478BF}" type="slidenum">
               <a:rPr lang="en-US" smtClean="0"/>
-              <a:t>‹N›</a:t>
+              <a:t>‹#›</a:t>
             </a:fld>
             <a:endParaRPr lang="en-US"/>
           </a:p>
@@ -1444,9 +1440,10 @@
           </a:lstStyle>
           <a:p>
             <a:r>
-              <a:rPr lang="en-US"/>
+              <a:rPr lang="en-US" smtClean="0"/>
               <a:t>Click to edit Master title style</a:t>
             </a:r>
+            <a:endParaRPr lang="en-US"/>
           </a:p>
         </p:txBody>
       </p:sp>
@@ -1509,7 +1506,7 @@
           <a:p>
             <a:pPr lvl="0"/>
             <a:r>
-              <a:rPr lang="en-US"/>
+              <a:rPr lang="en-US" smtClean="0"/>
               <a:t>Click to edit Master text styles</a:t>
             </a:r>
           </a:p>
@@ -1565,37 +1562,38 @@
           <a:p>
             <a:pPr lvl="0"/>
             <a:r>
-              <a:rPr lang="en-US"/>
+              <a:rPr lang="en-US" smtClean="0"/>
               <a:t>Click to edit Master text styles</a:t>
             </a:r>
           </a:p>
           <a:p>
             <a:pPr lvl="1"/>
             <a:r>
-              <a:rPr lang="en-US"/>
+              <a:rPr lang="en-US" smtClean="0"/>
               <a:t>Second level</a:t>
             </a:r>
           </a:p>
           <a:p>
             <a:pPr lvl="2"/>
             <a:r>
-              <a:rPr lang="en-US"/>
+              <a:rPr lang="en-US" smtClean="0"/>
               <a:t>Third level</a:t>
             </a:r>
           </a:p>
           <a:p>
             <a:pPr lvl="3"/>
             <a:r>
-              <a:rPr lang="en-US"/>
+              <a:rPr lang="en-US" smtClean="0"/>
               <a:t>Fourth level</a:t>
             </a:r>
           </a:p>
           <a:p>
             <a:pPr lvl="4"/>
             <a:r>
-              <a:rPr lang="en-US"/>
+              <a:rPr lang="en-US" smtClean="0"/>
               <a:t>Fifth level</a:t>
             </a:r>
+            <a:endParaRPr lang="en-US"/>
           </a:p>
         </p:txBody>
       </p:sp>
@@ -1658,7 +1656,7 @@
           <a:p>
             <a:pPr lvl="0"/>
             <a:r>
-              <a:rPr lang="en-US"/>
+              <a:rPr lang="en-US" smtClean="0"/>
               <a:t>Click to edit Master text styles</a:t>
             </a:r>
           </a:p>
@@ -1714,37 +1712,38 @@
           <a:p>
             <a:pPr lvl="0"/>
             <a:r>
-              <a:rPr lang="en-US"/>
+              <a:rPr lang="en-US" smtClean="0"/>
               <a:t>Click to edit Master text styles</a:t>
             </a:r>
           </a:p>
           <a:p>
             <a:pPr lvl="1"/>
             <a:r>
-              <a:rPr lang="en-US"/>
+              <a:rPr lang="en-US" smtClean="0"/>
               <a:t>Second level</a:t>
             </a:r>
           </a:p>
           <a:p>
             <a:pPr lvl="2"/>
             <a:r>
-              <a:rPr lang="en-US"/>
+              <a:rPr lang="en-US" smtClean="0"/>
               <a:t>Third level</a:t>
             </a:r>
           </a:p>
           <a:p>
             <a:pPr lvl="3"/>
             <a:r>
-              <a:rPr lang="en-US"/>
+              <a:rPr lang="en-US" smtClean="0"/>
               <a:t>Fourth level</a:t>
             </a:r>
           </a:p>
           <a:p>
             <a:pPr lvl="4"/>
             <a:r>
-              <a:rPr lang="en-US"/>
+              <a:rPr lang="en-US" smtClean="0"/>
               <a:t>Fifth level</a:t>
             </a:r>
+            <a:endParaRPr lang="en-US"/>
           </a:p>
         </p:txBody>
       </p:sp>
@@ -1765,7 +1764,7 @@
           <a:p>
             <a:fld id="{5BCAD085-E8A6-8845-BD4E-CB4CCA059FC4}" type="datetimeFigureOut">
               <a:rPr lang="en-US" smtClean="0"/>
-              <a:t>1/26/2026</a:t>
+              <a:t>1/27/13</a:t>
             </a:fld>
             <a:endParaRPr lang="en-US"/>
           </a:p>
@@ -1807,7 +1806,7 @@
           <a:p>
             <a:fld id="{C1FF6DA9-008F-8B48-92A6-B652298478BF}" type="slidenum">
               <a:rPr lang="en-US" smtClean="0"/>
-              <a:t>‹N›</a:t>
+              <a:t>‹#›</a:t>
             </a:fld>
             <a:endParaRPr lang="en-US"/>
           </a:p>
@@ -1859,9 +1858,10 @@
           <a:lstStyle/>
           <a:p>
             <a:r>
-              <a:rPr lang="en-US"/>
+              <a:rPr lang="en-US" smtClean="0"/>
               <a:t>Click to edit Master title style</a:t>
             </a:r>
+            <a:endParaRPr lang="en-US"/>
           </a:p>
         </p:txBody>
       </p:sp>
@@ -1882,7 +1882,7 @@
           <a:p>
             <a:fld id="{5BCAD085-E8A6-8845-BD4E-CB4CCA059FC4}" type="datetimeFigureOut">
               <a:rPr lang="en-US" smtClean="0"/>
-              <a:t>1/26/2026</a:t>
+              <a:t>1/27/13</a:t>
             </a:fld>
             <a:endParaRPr lang="en-US"/>
           </a:p>
@@ -1924,7 +1924,7 @@
           <a:p>
             <a:fld id="{C1FF6DA9-008F-8B48-92A6-B652298478BF}" type="slidenum">
               <a:rPr lang="en-US" smtClean="0"/>
-              <a:t>‹N›</a:t>
+              <a:t>‹#›</a:t>
             </a:fld>
             <a:endParaRPr lang="en-US"/>
           </a:p>
@@ -1977,7 +1977,7 @@
           <a:p>
             <a:fld id="{5BCAD085-E8A6-8845-BD4E-CB4CCA059FC4}" type="datetimeFigureOut">
               <a:rPr lang="en-US" smtClean="0"/>
-              <a:t>1/26/2026</a:t>
+              <a:t>1/27/13</a:t>
             </a:fld>
             <a:endParaRPr lang="en-US"/>
           </a:p>
@@ -2019,7 +2019,7 @@
           <a:p>
             <a:fld id="{C1FF6DA9-008F-8B48-92A6-B652298478BF}" type="slidenum">
               <a:rPr lang="en-US" smtClean="0"/>
-              <a:t>‹N›</a:t>
+              <a:t>‹#›</a:t>
             </a:fld>
             <a:endParaRPr lang="en-US"/>
           </a:p>
@@ -2080,9 +2080,10 @@
           </a:lstStyle>
           <a:p>
             <a:r>
-              <a:rPr lang="en-US"/>
+              <a:rPr lang="en-US" smtClean="0"/>
               <a:t>Click to edit Master title style</a:t>
             </a:r>
+            <a:endParaRPr lang="en-US"/>
           </a:p>
         </p:txBody>
       </p:sp>
@@ -2136,37 +2137,38 @@
           <a:p>
             <a:pPr lvl="0"/>
             <a:r>
-              <a:rPr lang="en-US"/>
+              <a:rPr lang="en-US" smtClean="0"/>
               <a:t>Click to edit Master text styles</a:t>
             </a:r>
           </a:p>
           <a:p>
             <a:pPr lvl="1"/>
             <a:r>
-              <a:rPr lang="en-US"/>
+              <a:rPr lang="en-US" smtClean="0"/>
               <a:t>Second level</a:t>
             </a:r>
           </a:p>
           <a:p>
             <a:pPr lvl="2"/>
             <a:r>
-              <a:rPr lang="en-US"/>
+              <a:rPr lang="en-US" smtClean="0"/>
               <a:t>Third level</a:t>
             </a:r>
           </a:p>
           <a:p>
             <a:pPr lvl="3"/>
             <a:r>
-              <a:rPr lang="en-US"/>
+              <a:rPr lang="en-US" smtClean="0"/>
               <a:t>Fourth level</a:t>
             </a:r>
           </a:p>
           <a:p>
             <a:pPr lvl="4"/>
             <a:r>
-              <a:rPr lang="en-US"/>
+              <a:rPr lang="en-US" smtClean="0"/>
               <a:t>Fifth level</a:t>
             </a:r>
+            <a:endParaRPr lang="en-US"/>
           </a:p>
         </p:txBody>
       </p:sp>
@@ -2229,7 +2231,7 @@
           <a:p>
             <a:pPr lvl="0"/>
             <a:r>
-              <a:rPr lang="en-US"/>
+              <a:rPr lang="en-US" smtClean="0"/>
               <a:t>Click to edit Master text styles</a:t>
             </a:r>
           </a:p>
@@ -2252,7 +2254,7 @@
           <a:p>
             <a:fld id="{5BCAD085-E8A6-8845-BD4E-CB4CCA059FC4}" type="datetimeFigureOut">
               <a:rPr lang="en-US" smtClean="0"/>
-              <a:t>1/26/2026</a:t>
+              <a:t>1/27/13</a:t>
             </a:fld>
             <a:endParaRPr lang="en-US"/>
           </a:p>
@@ -2294,7 +2296,7 @@
           <a:p>
             <a:fld id="{C1FF6DA9-008F-8B48-92A6-B652298478BF}" type="slidenum">
               <a:rPr lang="en-US" smtClean="0"/>
-              <a:t>‹N›</a:t>
+              <a:t>‹#›</a:t>
             </a:fld>
             <a:endParaRPr lang="en-US"/>
           </a:p>
@@ -2355,9 +2357,10 @@
           </a:lstStyle>
           <a:p>
             <a:r>
-              <a:rPr lang="en-US"/>
+              <a:rPr lang="en-US" smtClean="0"/>
               <a:t>Click to edit Master title style</a:t>
             </a:r>
+            <a:endParaRPr lang="en-US"/>
           </a:p>
         </p:txBody>
       </p:sp>
@@ -2481,7 +2484,7 @@
           <a:p>
             <a:pPr lvl="0"/>
             <a:r>
-              <a:rPr lang="en-US"/>
+              <a:rPr lang="en-US" smtClean="0"/>
               <a:t>Click to edit Master text styles</a:t>
             </a:r>
           </a:p>
@@ -2504,7 +2507,7 @@
           <a:p>
             <a:fld id="{5BCAD085-E8A6-8845-BD4E-CB4CCA059FC4}" type="datetimeFigureOut">
               <a:rPr lang="en-US" smtClean="0"/>
-              <a:t>1/26/2026</a:t>
+              <a:t>1/27/13</a:t>
             </a:fld>
             <a:endParaRPr lang="en-US"/>
           </a:p>
@@ -2546,7 +2549,7 @@
           <a:p>
             <a:fld id="{C1FF6DA9-008F-8B48-92A6-B652298478BF}" type="slidenum">
               <a:rPr lang="en-US" smtClean="0"/>
-              <a:t>‹N›</a:t>
+              <a:t>‹#›</a:t>
             </a:fld>
             <a:endParaRPr lang="en-US"/>
           </a:p>
@@ -2613,9 +2616,10 @@
           <a:lstStyle/>
           <a:p>
             <a:r>
-              <a:rPr lang="en-US"/>
+              <a:rPr lang="en-US" smtClean="0"/>
               <a:t>Click to edit Master title style</a:t>
             </a:r>
+            <a:endParaRPr lang="en-US"/>
           </a:p>
         </p:txBody>
       </p:sp>
@@ -2646,37 +2650,38 @@
           <a:p>
             <a:pPr lvl="0"/>
             <a:r>
-              <a:rPr lang="en-US"/>
+              <a:rPr lang="en-US" smtClean="0"/>
               <a:t>Click to edit Master text styles</a:t>
             </a:r>
           </a:p>
           <a:p>
             <a:pPr lvl="1"/>
             <a:r>
-              <a:rPr lang="en-US"/>
+              <a:rPr lang="en-US" smtClean="0"/>
               <a:t>Second level</a:t>
             </a:r>
           </a:p>
           <a:p>
             <a:pPr lvl="2"/>
             <a:r>
-              <a:rPr lang="en-US"/>
+              <a:rPr lang="en-US" smtClean="0"/>
               <a:t>Third level</a:t>
             </a:r>
           </a:p>
           <a:p>
             <a:pPr lvl="3"/>
             <a:r>
-              <a:rPr lang="en-US"/>
+              <a:rPr lang="en-US" smtClean="0"/>
               <a:t>Fourth level</a:t>
             </a:r>
           </a:p>
           <a:p>
             <a:pPr lvl="4"/>
             <a:r>
-              <a:rPr lang="en-US"/>
+              <a:rPr lang="en-US" smtClean="0"/>
               <a:t>Fifth level</a:t>
             </a:r>
+            <a:endParaRPr lang="en-US"/>
           </a:p>
         </p:txBody>
       </p:sp>
@@ -2715,7 +2720,7 @@
           <a:p>
             <a:fld id="{5BCAD085-E8A6-8845-BD4E-CB4CCA059FC4}" type="datetimeFigureOut">
               <a:rPr lang="en-US" smtClean="0"/>
-              <a:t>1/26/2026</a:t>
+              <a:t>1/27/13</a:t>
             </a:fld>
             <a:endParaRPr lang="en-US"/>
           </a:p>
@@ -2793,7 +2798,7 @@
           <a:p>
             <a:fld id="{C1FF6DA9-008F-8B48-92A6-B652298478BF}" type="slidenum">
               <a:rPr lang="en-US" smtClean="0"/>
-              <a:t>‹N›</a:t>
+              <a:t>‹#›</a:t>
             </a:fld>
             <a:endParaRPr lang="en-US"/>
           </a:p>
@@ -3074,7 +3079,7 @@
 </file>
 
 <file path=ppt/slides/slide1.xml><?xml version="1.0" encoding="utf-8"?>
-<p:sld xmlns:a="http://schemas.openxmlformats.org/drawingml/2006/main" xmlns:r="http://schemas.openxmlformats.org/officeDocument/2006/relationships" xmlns:p="http://schemas.openxmlformats.org/presentationml/2006/main">
+<p:sld xmlns:a="http://schemas.openxmlformats.org/drawingml/2006/main" xmlns:p="http://schemas.openxmlformats.org/presentationml/2006/main" xmlns:r="http://schemas.openxmlformats.org/officeDocument/2006/relationships">
   <p:cSld>
     <p:bg>
       <p:bgPr>
@@ -3090,14 +3095,7 @@
         <p:cNvGrpSpPr/>
         <p:nvPr/>
       </p:nvGrpSpPr>
-      <p:grpSpPr>
-        <a:xfrm>
-          <a:off x="0" y="0"/>
-          <a:ext cx="0" cy="0"/>
-          <a:chOff x="0" y="0"/>
-          <a:chExt cx="0" cy="0"/>
-        </a:xfrm>
-      </p:grpSpPr>
+      <p:grpSpPr/>
       <p:sp>
         <p:nvSpPr>
           <p:cNvPr id="2" name="TextBox 1"/>
@@ -3213,78 +3211,8 @@
               <a:defRPr sz="1800" b="1"/>
             </a:pPr>
             <a:r>
-              <a:rPr dirty="0"/>
-              <a:t>📊 </a:t>
-            </a:r>
-            <a:r>
-              <a:rPr dirty="0">
-                <a:solidFill>
-                  <a:schemeClr val="tx1"/>
-                </a:solidFill>
-              </a:rPr>
-              <a:t>INPUT: 1,763 </a:t>
-            </a:r>
-            <a:r>
-              <a:rPr dirty="0" err="1">
-                <a:solidFill>
-                  <a:schemeClr val="tx1"/>
-                </a:solidFill>
-              </a:rPr>
-              <a:t>tabelle</a:t>
-            </a:r>
-            <a:r>
-              <a:rPr dirty="0">
-                <a:solidFill>
-                  <a:schemeClr val="tx1"/>
-                </a:solidFill>
-              </a:rPr>
-              <a:t> </a:t>
-            </a:r>
-            <a:r>
-              <a:rPr dirty="0" err="1">
-                <a:solidFill>
-                  <a:schemeClr val="tx1"/>
-                </a:solidFill>
-              </a:rPr>
-              <a:t>analizzate</a:t>
-            </a:r>
-            <a:r>
-              <a:rPr dirty="0">
-                <a:solidFill>
-                  <a:schemeClr val="tx1"/>
-                </a:solidFill>
-              </a:rPr>
-              <a:t> → 3,070 </a:t>
-            </a:r>
-            <a:r>
-              <a:rPr dirty="0" err="1">
-                <a:solidFill>
-                  <a:schemeClr val="tx1"/>
-                </a:solidFill>
-              </a:rPr>
-              <a:t>oggetti</a:t>
-            </a:r>
-            <a:r>
-              <a:rPr dirty="0">
-                <a:solidFill>
-                  <a:schemeClr val="tx1"/>
-                </a:solidFill>
-              </a:rPr>
-              <a:t> </a:t>
-            </a:r>
-            <a:r>
-              <a:rPr dirty="0" err="1">
-                <a:solidFill>
-                  <a:schemeClr val="tx1"/>
-                </a:solidFill>
-              </a:rPr>
-              <a:t>estratti</a:t>
-            </a:r>
-            <a:endParaRPr dirty="0">
-              <a:solidFill>
-                <a:schemeClr val="tx1"/>
-              </a:solidFill>
-            </a:endParaRPr>
+              <a:t>📊 INPUT: 1,763 tabelle analizzate → 3,070 oggetti estratti</a:t>
+            </a:r>
           </a:p>
         </p:txBody>
       </p:sp>
@@ -3326,7 +3254,7 @@
           </a:fontRef>
         </p:style>
         <p:txBody>
-          <a:bodyPr wrap="square" rtlCol="0" anchor="ctr"/>
+          <a:bodyPr rtlCol="0" anchor="ctr" wrap="square"/>
           <a:lstStyle/>
           <a:p>
             <a:pPr algn="ctr">
@@ -3337,16 +3265,7 @@
               </a:defRPr>
             </a:pPr>
             <a:r>
-              <a:rPr dirty="0"/>
-              <a:t>🎯 OGGETTI CRITICI: 532 (</a:t>
-            </a:r>
-            <a:r>
-              <a:rPr dirty="0" err="1"/>
-              <a:t>Validati</a:t>
-            </a:r>
-            <a:r>
-              <a:rPr dirty="0"/>
-              <a:t> 100%)</a:t>
+              <a:t>🎯 OGGETTI CRITICI: 532 (Validati 100%)</a:t>
             </a:r>
           </a:p>
           <a:p>
@@ -3357,11 +3276,6 @@
               <a:defRPr sz="1600"/>
             </a:pPr>
             <a:r>
-              <a:rPr dirty="0">
-                <a:solidFill>
-                  <a:schemeClr val="tx1"/>
-                </a:solidFill>
-              </a:rPr>
               <a:t>L1: 333  •  L2: 145  •  L3: 45  •  L4: 9</a:t>
             </a:r>
           </a:p>
@@ -3375,8 +3289,8 @@
         </p:nvSpPr>
         <p:spPr>
           <a:xfrm>
-            <a:off x="731520" y="4846320"/>
-            <a:ext cx="7680960" cy="365760"/>
+            <a:off x="731520" y="4663440"/>
+            <a:ext cx="3657600" cy="365760"/>
           </a:xfrm>
           <a:prstGeom prst="rect">
             <a:avLst/>
@@ -3390,24 +3304,271 @@
           <a:lstStyle/>
           <a:p>
             <a:pPr algn="ctr">
-              <a:defRPr sz="1600" b="1"/>
+              <a:defRPr sz="1400" b="1"/>
             </a:pPr>
             <a:r>
-              <a:t>📍 DISTRIBUZIONE DATABASE</a:t>
-            </a:r>
-          </a:p>
-        </p:txBody>
-      </p:sp>
-      <p:sp>
-        <p:nvSpPr>
-          <p:cNvPr id="7" name="Rectangle 6"/>
+              <a:t>📦 PER TIPOLOGIA</a:t>
+            </a:r>
+          </a:p>
+        </p:txBody>
+      </p:sp>
+      <p:sp>
+        <p:nvSpPr>
+          <p:cNvPr id="7" name="Rounded Rectangle 6"/>
           <p:cNvSpPr/>
           <p:nvPr/>
         </p:nvSpPr>
         <p:spPr>
           <a:xfrm>
-            <a:off x="1371600" y="5303520"/>
-            <a:ext cx="1463040" cy="731520"/>
+            <a:off x="822960" y="5029200"/>
+            <a:ext cx="1554480" cy="502920"/>
+          </a:xfrm>
+          <a:prstGeom prst="roundRect">
+            <a:avLst/>
+          </a:prstGeom>
+          <a:solidFill>
+            <a:srgbClr val="4682B4"/>
+          </a:solidFill>
+          <a:ln w="12700">
+            <a:solidFill>
+              <a:srgbClr val="FFFFFF"/>
+            </a:solidFill>
+          </a:ln>
+        </p:spPr>
+        <p:style>
+          <a:lnRef idx="1">
+            <a:schemeClr val="accent1"/>
+          </a:lnRef>
+          <a:fillRef idx="3">
+            <a:schemeClr val="accent1"/>
+          </a:fillRef>
+          <a:effectRef idx="2">
+            <a:schemeClr val="accent1"/>
+          </a:effectRef>
+          <a:fontRef idx="minor">
+            <a:schemeClr val="lt1"/>
+          </a:fontRef>
+        </p:style>
+        <p:txBody>
+          <a:bodyPr rtlCol="0" anchor="t" wrap="square"/>
+          <a:lstStyle/>
+          <a:p>
+            <a:pPr algn="ctr">
+              <a:defRPr sz="1400" b="1">
+                <a:solidFill>
+                  <a:srgbClr val="FFFFFF"/>
+                </a:solidFill>
+              </a:defRPr>
+            </a:pPr>
+            <a:r>
+              <a:t>Stored Proc.: 320</a:t>
+            </a:r>
+          </a:p>
+        </p:txBody>
+      </p:sp>
+      <p:sp>
+        <p:nvSpPr>
+          <p:cNvPr id="8" name="Rounded Rectangle 7"/>
+          <p:cNvSpPr/>
+          <p:nvPr/>
+        </p:nvSpPr>
+        <p:spPr>
+          <a:xfrm>
+            <a:off x="2560320" y="5029200"/>
+            <a:ext cx="1554480" cy="502920"/>
+          </a:xfrm>
+          <a:prstGeom prst="roundRect">
+            <a:avLst/>
+          </a:prstGeom>
+          <a:solidFill>
+            <a:srgbClr val="8A2BE2"/>
+          </a:solidFill>
+          <a:ln w="12700">
+            <a:solidFill>
+              <a:srgbClr val="FFFFFF"/>
+            </a:solidFill>
+          </a:ln>
+        </p:spPr>
+        <p:style>
+          <a:lnRef idx="1">
+            <a:schemeClr val="accent1"/>
+          </a:lnRef>
+          <a:fillRef idx="3">
+            <a:schemeClr val="accent1"/>
+          </a:fillRef>
+          <a:effectRef idx="2">
+            <a:schemeClr val="accent1"/>
+          </a:effectRef>
+          <a:fontRef idx="minor">
+            <a:schemeClr val="lt1"/>
+          </a:fontRef>
+        </p:style>
+        <p:txBody>
+          <a:bodyPr rtlCol="0" anchor="t" wrap="square"/>
+          <a:lstStyle/>
+          <a:p>
+            <a:pPr algn="ctr">
+              <a:defRPr sz="1400" b="1">
+                <a:solidFill>
+                  <a:srgbClr val="FFFFFF"/>
+                </a:solidFill>
+              </a:defRPr>
+            </a:pPr>
+            <a:r>
+              <a:t>Functions: 125</a:t>
+            </a:r>
+          </a:p>
+        </p:txBody>
+      </p:sp>
+      <p:sp>
+        <p:nvSpPr>
+          <p:cNvPr id="9" name="Rounded Rectangle 8"/>
+          <p:cNvSpPr/>
+          <p:nvPr/>
+        </p:nvSpPr>
+        <p:spPr>
+          <a:xfrm>
+            <a:off x="822960" y="5623560"/>
+            <a:ext cx="1554480" cy="502920"/>
+          </a:xfrm>
+          <a:prstGeom prst="roundRect">
+            <a:avLst/>
+          </a:prstGeom>
+          <a:solidFill>
+            <a:srgbClr val="DC143C"/>
+          </a:solidFill>
+          <a:ln w="12700">
+            <a:solidFill>
+              <a:srgbClr val="FFFFFF"/>
+            </a:solidFill>
+          </a:ln>
+        </p:spPr>
+        <p:style>
+          <a:lnRef idx="1">
+            <a:schemeClr val="accent1"/>
+          </a:lnRef>
+          <a:fillRef idx="3">
+            <a:schemeClr val="accent1"/>
+          </a:fillRef>
+          <a:effectRef idx="2">
+            <a:schemeClr val="accent1"/>
+          </a:effectRef>
+          <a:fontRef idx="minor">
+            <a:schemeClr val="lt1"/>
+          </a:fontRef>
+        </p:style>
+        <p:txBody>
+          <a:bodyPr rtlCol="0" anchor="t" wrap="square"/>
+          <a:lstStyle/>
+          <a:p>
+            <a:pPr algn="ctr">
+              <a:defRPr sz="1400" b="1">
+                <a:solidFill>
+                  <a:srgbClr val="FFFFFF"/>
+                </a:solidFill>
+              </a:defRPr>
+            </a:pPr>
+            <a:r>
+              <a:t>Views: 65</a:t>
+            </a:r>
+          </a:p>
+        </p:txBody>
+      </p:sp>
+      <p:sp>
+        <p:nvSpPr>
+          <p:cNvPr id="10" name="Rounded Rectangle 9"/>
+          <p:cNvSpPr/>
+          <p:nvPr/>
+        </p:nvSpPr>
+        <p:spPr>
+          <a:xfrm>
+            <a:off x="2560320" y="5623560"/>
+            <a:ext cx="1554480" cy="502920"/>
+          </a:xfrm>
+          <a:prstGeom prst="roundRect">
+            <a:avLst/>
+          </a:prstGeom>
+          <a:solidFill>
+            <a:srgbClr val="FF8C00"/>
+          </a:solidFill>
+          <a:ln w="12700">
+            <a:solidFill>
+              <a:srgbClr val="FFFFFF"/>
+            </a:solidFill>
+          </a:ln>
+        </p:spPr>
+        <p:style>
+          <a:lnRef idx="1">
+            <a:schemeClr val="accent1"/>
+          </a:lnRef>
+          <a:fillRef idx="3">
+            <a:schemeClr val="accent1"/>
+          </a:fillRef>
+          <a:effectRef idx="2">
+            <a:schemeClr val="accent1"/>
+          </a:effectRef>
+          <a:fontRef idx="minor">
+            <a:schemeClr val="lt1"/>
+          </a:fontRef>
+        </p:style>
+        <p:txBody>
+          <a:bodyPr rtlCol="0" anchor="t" wrap="square"/>
+          <a:lstStyle/>
+          <a:p>
+            <a:pPr algn="ctr">
+              <a:defRPr sz="1400" b="1">
+                <a:solidFill>
+                  <a:srgbClr val="FFFFFF"/>
+                </a:solidFill>
+              </a:defRPr>
+            </a:pPr>
+            <a:r>
+              <a:t>Triggers: 22</a:t>
+            </a:r>
+          </a:p>
+        </p:txBody>
+      </p:sp>
+      <p:sp>
+        <p:nvSpPr>
+          <p:cNvPr id="11" name="TextBox 10"/>
+          <p:cNvSpPr txBox="1"/>
+          <p:nvPr/>
+        </p:nvSpPr>
+        <p:spPr>
+          <a:xfrm>
+            <a:off x="4663440" y="4663440"/>
+            <a:ext cx="3657600" cy="365760"/>
+          </a:xfrm>
+          <a:prstGeom prst="rect">
+            <a:avLst/>
+          </a:prstGeom>
+          <a:noFill/>
+        </p:spPr>
+        <p:txBody>
+          <a:bodyPr wrap="none">
+            <a:spAutoFit/>
+          </a:bodyPr>
+          <a:lstStyle/>
+          <a:p>
+            <a:pPr algn="ctr">
+              <a:defRPr sz="1400" b="1"/>
+            </a:pPr>
+            <a:r>
+              <a:t>📍 PER DATABASE</a:t>
+            </a:r>
+          </a:p>
+        </p:txBody>
+      </p:sp>
+      <p:sp>
+        <p:nvSpPr>
+          <p:cNvPr id="12" name="Rectangle 11"/>
+          <p:cNvSpPr/>
+          <p:nvPr/>
+        </p:nvSpPr>
+        <p:spPr>
+          <a:xfrm>
+            <a:off x="4754880" y="5029200"/>
+            <a:ext cx="1645920" cy="320040"/>
           </a:xfrm>
           <a:prstGeom prst="rect">
             <a:avLst/>
@@ -3436,56 +3597,32 @@
           </a:fontRef>
         </p:style>
         <p:txBody>
-          <a:bodyPr wrap="square" rtlCol="0" anchor="ctr"/>
+          <a:bodyPr rtlCol="0" anchor="t" wrap="square"/>
           <a:lstStyle/>
           <a:p>
             <a:pPr algn="ctr">
-              <a:defRPr sz="1400" b="1">
+              <a:defRPr sz="1200" b="1">
                 <a:solidFill>
                   <a:srgbClr val="FFFFFF"/>
                 </a:solidFill>
               </a:defRPr>
             </a:pPr>
             <a:r>
-              <a:t>AMS</a:t>
-            </a:r>
-          </a:p>
-          <a:p>
-            <a:pPr algn="ctr">
-              <a:defRPr sz="1800" b="1">
-                <a:solidFill>
-                  <a:srgbClr val="FFFFFF"/>
-                </a:solidFill>
-              </a:defRPr>
-            </a:pPr>
-            <a:r>
-              <a:t>148</a:t>
-            </a:r>
-          </a:p>
-          <a:p>
-            <a:pPr algn="ctr">
-              <a:defRPr sz="1200">
-                <a:solidFill>
-                  <a:srgbClr val="FFFFFF"/>
-                </a:solidFill>
-              </a:defRPr>
-            </a:pPr>
-            <a:r>
-              <a:t>(44%)</a:t>
-            </a:r>
-          </a:p>
-        </p:txBody>
-      </p:sp>
-      <p:sp>
-        <p:nvSpPr>
-          <p:cNvPr id="8" name="Rectangle 7"/>
+              <a:t>AMS: 148 (44%)</a:t>
+            </a:r>
+          </a:p>
+        </p:txBody>
+      </p:sp>
+      <p:sp>
+        <p:nvSpPr>
+          <p:cNvPr id="13" name="Rectangle 12"/>
           <p:cNvSpPr/>
           <p:nvPr/>
         </p:nvSpPr>
         <p:spPr>
           <a:xfrm>
-            <a:off x="3017520" y="5303520"/>
-            <a:ext cx="1463040" cy="731520"/>
+            <a:off x="4754880" y="5394960"/>
+            <a:ext cx="1645920" cy="320040"/>
           </a:xfrm>
           <a:prstGeom prst="rect">
             <a:avLst/>
@@ -3514,56 +3651,32 @@
           </a:fontRef>
         </p:style>
         <p:txBody>
-          <a:bodyPr wrap="square" rtlCol="0" anchor="ctr"/>
+          <a:bodyPr rtlCol="0" anchor="t" wrap="square"/>
           <a:lstStyle/>
           <a:p>
             <a:pPr algn="ctr">
-              <a:defRPr sz="1400" b="1">
+              <a:defRPr sz="1200" b="1">
                 <a:solidFill>
                   <a:srgbClr val="FFFFFF"/>
                 </a:solidFill>
               </a:defRPr>
             </a:pPr>
             <a:r>
-              <a:t>CORESQL7</a:t>
-            </a:r>
-          </a:p>
-          <a:p>
-            <a:pPr algn="ctr">
-              <a:defRPr sz="1800" b="1">
-                <a:solidFill>
-                  <a:srgbClr val="FFFFFF"/>
-                </a:solidFill>
-              </a:defRPr>
-            </a:pPr>
-            <a:r>
-              <a:t>111</a:t>
-            </a:r>
-          </a:p>
-          <a:p>
-            <a:pPr algn="ctr">
-              <a:defRPr sz="1200">
-                <a:solidFill>
-                  <a:srgbClr val="FFFFFF"/>
-                </a:solidFill>
-              </a:defRPr>
-            </a:pPr>
-            <a:r>
-              <a:t>(33%)</a:t>
-            </a:r>
-          </a:p>
-        </p:txBody>
-      </p:sp>
-      <p:sp>
-        <p:nvSpPr>
-          <p:cNvPr id="9" name="Rectangle 8"/>
+              <a:t>CORESQL7: 111 (33%)</a:t>
+            </a:r>
+          </a:p>
+        </p:txBody>
+      </p:sp>
+      <p:sp>
+        <p:nvSpPr>
+          <p:cNvPr id="14" name="Rectangle 13"/>
           <p:cNvSpPr/>
           <p:nvPr/>
         </p:nvSpPr>
         <p:spPr>
           <a:xfrm>
-            <a:off x="4663440" y="5303520"/>
-            <a:ext cx="1463040" cy="731520"/>
+            <a:off x="4754880" y="5760720"/>
+            <a:ext cx="1645920" cy="320040"/>
           </a:xfrm>
           <a:prstGeom prst="rect">
             <a:avLst/>
@@ -3592,56 +3705,32 @@
           </a:fontRef>
         </p:style>
         <p:txBody>
-          <a:bodyPr wrap="square" rtlCol="0" anchor="ctr"/>
+          <a:bodyPr rtlCol="0" anchor="t" wrap="square"/>
           <a:lstStyle/>
           <a:p>
             <a:pPr algn="ctr">
-              <a:defRPr sz="1400" b="1">
+              <a:defRPr sz="1200" b="1">
                 <a:solidFill>
                   <a:srgbClr val="FFFFFF"/>
                 </a:solidFill>
               </a:defRPr>
             </a:pPr>
             <a:r>
-              <a:t>S1057</a:t>
-            </a:r>
-          </a:p>
-          <a:p>
-            <a:pPr algn="ctr">
-              <a:defRPr sz="1800" b="1">
-                <a:solidFill>
-                  <a:srgbClr val="FFFFFF"/>
-                </a:solidFill>
-              </a:defRPr>
-            </a:pPr>
-            <a:r>
-              <a:t>37</a:t>
-            </a:r>
-          </a:p>
-          <a:p>
-            <a:pPr algn="ctr">
-              <a:defRPr sz="1200">
-                <a:solidFill>
-                  <a:srgbClr val="FFFFFF"/>
-                </a:solidFill>
-              </a:defRPr>
-            </a:pPr>
-            <a:r>
-              <a:t>(11%)</a:t>
-            </a:r>
-          </a:p>
-        </p:txBody>
-      </p:sp>
-      <p:sp>
-        <p:nvSpPr>
-          <p:cNvPr id="10" name="Rectangle 9"/>
+              <a:t>S1057: 37 (11%)</a:t>
+            </a:r>
+          </a:p>
+        </p:txBody>
+      </p:sp>
+      <p:sp>
+        <p:nvSpPr>
+          <p:cNvPr id="15" name="Rectangle 14"/>
           <p:cNvSpPr/>
           <p:nvPr/>
         </p:nvSpPr>
         <p:spPr>
           <a:xfrm>
-            <a:off x="6309360" y="5303520"/>
-            <a:ext cx="1463040" cy="731520"/>
+            <a:off x="4754880" y="6126480"/>
+            <a:ext cx="1645920" cy="320040"/>
           </a:xfrm>
           <a:prstGeom prst="rect">
             <a:avLst/>
@@ -3670,49 +3759,25 @@
           </a:fontRef>
         </p:style>
         <p:txBody>
-          <a:bodyPr wrap="square" rtlCol="0" anchor="ctr"/>
+          <a:bodyPr rtlCol="0" anchor="t" wrap="square"/>
           <a:lstStyle/>
           <a:p>
             <a:pPr algn="ctr">
-              <a:defRPr sz="1400" b="1">
+              <a:defRPr sz="1200" b="1">
                 <a:solidFill>
                   <a:srgbClr val="FFFFFF"/>
                 </a:solidFill>
               </a:defRPr>
             </a:pPr>
             <a:r>
-              <a:t>Altri 6 DB</a:t>
-            </a:r>
-          </a:p>
-          <a:p>
-            <a:pPr algn="ctr">
-              <a:defRPr sz="1800" b="1">
-                <a:solidFill>
-                  <a:srgbClr val="FFFFFF"/>
-                </a:solidFill>
-              </a:defRPr>
-            </a:pPr>
-            <a:r>
-              <a:t>236</a:t>
-            </a:r>
-          </a:p>
-          <a:p>
-            <a:pPr algn="ctr">
-              <a:defRPr sz="1200">
-                <a:solidFill>
-                  <a:srgbClr val="FFFFFF"/>
-                </a:solidFill>
-              </a:defRPr>
-            </a:pPr>
-            <a:r>
-              <a:t>(12%)</a:t>
-            </a:r>
-          </a:p>
-        </p:txBody>
-      </p:sp>
-      <p:sp>
-        <p:nvSpPr>
-          <p:cNvPr id="11" name="TextBox 10"/>
+              <a:t>Altri 6 DB: 236 (12%)</a:t>
+            </a:r>
+          </a:p>
+        </p:txBody>
+      </p:sp>
+      <p:sp>
+        <p:nvSpPr>
+          <p:cNvPr id="16" name="TextBox 15"/>
           <p:cNvSpPr txBox="1"/>
           <p:nvPr/>
         </p:nvSpPr>
@@ -4071,10 +4136,4 @@
   </a:objectDefaults>
   <a:extraClrSchemeLst/>
 </a:theme>
-</file>
-
-<file path=docMetadata/LabelInfo.xml><?xml version="1.0" encoding="utf-8"?>
-<clbl:labelList xmlns:clbl="http://schemas.microsoft.com/office/2020/mipLabelMetadata">
-  <clbl:label id="{5fae8262-b78e-4366-8929-a5d6aac95320}" enabled="1" method="Standard" siteId="{cf36141c-ddd7-45a7-b073-111f66d0b30c}" contentBits="0" removed="0"/>
-</clbl:labelList>
 </file>
</xml_diff>